<commit_message>
statistics and presentation improved
</commit_message>
<xml_diff>
--- a/Presentation/W2-sharks-DavidMC-ongoing.pptx
+++ b/Presentation/W2-sharks-DavidMC-ongoing.pptx
@@ -6,10 +6,13 @@
   </p:sldMasterIdLst>
   <p:sldIdLst>
     <p:sldId id="257" r:id="rId2"/>
-    <p:sldId id="256" r:id="rId3"/>
-    <p:sldId id="258" r:id="rId4"/>
-    <p:sldId id="259" r:id="rId5"/>
-    <p:sldId id="260" r:id="rId6"/>
+    <p:sldId id="258" r:id="rId3"/>
+    <p:sldId id="256" r:id="rId4"/>
+    <p:sldId id="262" r:id="rId5"/>
+    <p:sldId id="263" r:id="rId6"/>
+    <p:sldId id="259" r:id="rId7"/>
+    <p:sldId id="260" r:id="rId8"/>
+    <p:sldId id="261" r:id="rId9"/>
   </p:sldIdLst>
   <p:sldSz cx="12192000" cy="6858000"/>
   <p:notesSz cx="6858000" cy="9144000"/>
@@ -3537,7 +3540,7 @@
         <p:spPr>
           <a:xfrm>
             <a:off x="6216760" y="321733"/>
-            <a:ext cx="5766112" cy="1200329"/>
+            <a:ext cx="5766112" cy="461665"/>
           </a:xfrm>
           <a:prstGeom prst="rect">
             <a:avLst/>
@@ -3569,14 +3572,6 @@
                 <a:latin typeface="Arial" panose="020B0604020202020204" pitchFamily="34" charset="0"/>
               </a:rPr>
               <a:t>W2-PANDAS-PROJECT</a:t>
-            </a:r>
-          </a:p>
-          <a:p>
-            <a:r>
-              <a:rPr lang="en-US" sz="2400" b="1" dirty="0">
-                <a:latin typeface="Arial" panose="020B0604020202020204" pitchFamily="34" charset="0"/>
-              </a:rPr>
-              <a:t>Objective: Clean the shark attack file to be analyzed afterwards</a:t>
             </a:r>
           </a:p>
         </p:txBody>
@@ -3733,8 +3728,8 @@
         </p:nvSpPr>
         <p:spPr>
           <a:xfrm>
-            <a:off x="6216760" y="1586750"/>
-            <a:ext cx="5766112" cy="1200329"/>
+            <a:off x="6216760" y="880266"/>
+            <a:ext cx="5766112" cy="1384995"/>
           </a:xfrm>
           <a:prstGeom prst="rect">
             <a:avLst/>
@@ -3769,7 +3764,7 @@
           </a:p>
           <a:p>
             <a:r>
-              <a:rPr lang="en-US" sz="2400" b="1" dirty="0">
+              <a:rPr lang="en-US" sz="2000" b="1" dirty="0">
                 <a:latin typeface="Arial" panose="020B0604020202020204" pitchFamily="34" charset="0"/>
               </a:rPr>
               <a:t>To eliminate the no valid values</a:t>
@@ -3777,10 +3772,18 @@
           </a:p>
           <a:p>
             <a:r>
-              <a:rPr lang="en-US" sz="2400" b="1" dirty="0">
+              <a:rPr lang="en-US" sz="2000" b="1" dirty="0">
                 <a:latin typeface="Arial" panose="020B0604020202020204" pitchFamily="34" charset="0"/>
               </a:rPr>
               <a:t>To standardize the data set</a:t>
+            </a:r>
+          </a:p>
+          <a:p>
+            <a:r>
+              <a:rPr lang="en-US" sz="2000" b="1" dirty="0">
+                <a:latin typeface="Arial" panose="020B0604020202020204" pitchFamily="34" charset="0"/>
+              </a:rPr>
+              <a:t>To generate statistics about the attacks</a:t>
             </a:r>
           </a:p>
         </p:txBody>
@@ -3799,6 +3802,333 @@
 </file>
 
 <file path=ppt/slides/slide2.xml><?xml version="1.0" encoding="utf-8"?>
+<p:sld xmlns:a="http://schemas.openxmlformats.org/drawingml/2006/main" xmlns:r="http://schemas.openxmlformats.org/officeDocument/2006/relationships" xmlns:p="http://schemas.openxmlformats.org/presentationml/2006/main">
+  <p:cSld>
+    <p:spTree>
+      <p:nvGrpSpPr>
+        <p:cNvPr id="1" name=""/>
+        <p:cNvGrpSpPr/>
+        <p:nvPr/>
+      </p:nvGrpSpPr>
+      <p:grpSpPr>
+        <a:xfrm>
+          <a:off x="0" y="0"/>
+          <a:ext cx="0" cy="0"/>
+          <a:chOff x="0" y="0"/>
+          <a:chExt cx="0" cy="0"/>
+        </a:xfrm>
+      </p:grpSpPr>
+      <p:pic>
+        <p:nvPicPr>
+          <p:cNvPr id="2" name="Imagen 1" descr="Gráfico&#10;&#10;Descripción generada automáticamente">
+            <a:extLst>
+              <a:ext uri="{FF2B5EF4-FFF2-40B4-BE49-F238E27FC236}">
+                <a16:creationId xmlns:a16="http://schemas.microsoft.com/office/drawing/2014/main" id="{8B168F45-3617-CA0A-B2C2-4E1791E20E2E}"/>
+              </a:ext>
+            </a:extLst>
+          </p:cNvPr>
+          <p:cNvPicPr>
+            <a:picLocks noChangeAspect="1"/>
+          </p:cNvPicPr>
+          <p:nvPr/>
+        </p:nvPicPr>
+        <p:blipFill>
+          <a:blip r:embed="rId2">
+            <a:extLst>
+              <a:ext uri="{28A0092B-C50C-407E-A947-70E740481C1C}">
+                <a14:useLocalDpi xmlns:a14="http://schemas.microsoft.com/office/drawing/2010/main" val="0"/>
+              </a:ext>
+            </a:extLst>
+          </a:blip>
+          <a:stretch>
+            <a:fillRect/>
+          </a:stretch>
+        </p:blipFill>
+        <p:spPr>
+          <a:xfrm>
+            <a:off x="108625" y="1926547"/>
+            <a:ext cx="3836504" cy="3071060"/>
+          </a:xfrm>
+          <a:prstGeom prst="rect">
+            <a:avLst/>
+          </a:prstGeom>
+        </p:spPr>
+      </p:pic>
+      <p:pic>
+        <p:nvPicPr>
+          <p:cNvPr id="3" name="Imagen 2" descr="Gráfico, Gráfico de barras&#10;&#10;Descripción generada automáticamente">
+            <a:extLst>
+              <a:ext uri="{FF2B5EF4-FFF2-40B4-BE49-F238E27FC236}">
+                <a16:creationId xmlns:a16="http://schemas.microsoft.com/office/drawing/2014/main" id="{13186CDC-C9BC-3820-241C-C523435D9FE6}"/>
+              </a:ext>
+            </a:extLst>
+          </p:cNvPr>
+          <p:cNvPicPr>
+            <a:picLocks noChangeAspect="1"/>
+          </p:cNvPicPr>
+          <p:nvPr/>
+        </p:nvPicPr>
+        <p:blipFill>
+          <a:blip r:embed="rId3">
+            <a:extLst>
+              <a:ext uri="{28A0092B-C50C-407E-A947-70E740481C1C}">
+                <a14:useLocalDpi xmlns:a14="http://schemas.microsoft.com/office/drawing/2010/main" val="0"/>
+              </a:ext>
+            </a:extLst>
+          </a:blip>
+          <a:stretch>
+            <a:fillRect/>
+          </a:stretch>
+        </p:blipFill>
+        <p:spPr>
+          <a:xfrm>
+            <a:off x="3976700" y="1926545"/>
+            <a:ext cx="3836504" cy="3080270"/>
+          </a:xfrm>
+          <a:prstGeom prst="rect">
+            <a:avLst/>
+          </a:prstGeom>
+        </p:spPr>
+      </p:pic>
+      <p:pic>
+        <p:nvPicPr>
+          <p:cNvPr id="9" name="Picture 4" descr="Ironhack - Home | Facebook">
+            <a:extLst>
+              <a:ext uri="{FF2B5EF4-FFF2-40B4-BE49-F238E27FC236}">
+                <a16:creationId xmlns:a16="http://schemas.microsoft.com/office/drawing/2014/main" id="{24480A59-E6B8-A736-0948-4C719F0F3A8C}"/>
+              </a:ext>
+            </a:extLst>
+          </p:cNvPr>
+          <p:cNvPicPr>
+            <a:picLocks noChangeAspect="1" noChangeArrowheads="1"/>
+          </p:cNvPicPr>
+          <p:nvPr/>
+        </p:nvPicPr>
+        <p:blipFill>
+          <a:blip r:embed="rId4">
+            <a:extLst>
+              <a:ext uri="{28A0092B-C50C-407E-A947-70E740481C1C}">
+                <a14:useLocalDpi xmlns:a14="http://schemas.microsoft.com/office/drawing/2010/main" val="0"/>
+              </a:ext>
+            </a:extLst>
+          </a:blip>
+          <a:srcRect/>
+          <a:stretch>
+            <a:fillRect/>
+          </a:stretch>
+        </p:blipFill>
+        <p:spPr bwMode="auto">
+          <a:xfrm>
+            <a:off x="-1" y="55740"/>
+            <a:ext cx="1325587" cy="1325587"/>
+          </a:xfrm>
+          <a:prstGeom prst="rect">
+            <a:avLst/>
+          </a:prstGeom>
+          <a:noFill/>
+          <a:extLst>
+            <a:ext uri="{909E8E84-426E-40DD-AFC4-6F175D3DCCD1}">
+              <a14:hiddenFill xmlns:a14="http://schemas.microsoft.com/office/drawing/2010/main">
+                <a:solidFill>
+                  <a:srgbClr val="FFFFFF"/>
+                </a:solidFill>
+              </a14:hiddenFill>
+            </a:ext>
+          </a:extLst>
+        </p:spPr>
+      </p:pic>
+      <p:sp>
+        <p:nvSpPr>
+          <p:cNvPr id="10" name="CuadroTexto 9">
+            <a:extLst>
+              <a:ext uri="{FF2B5EF4-FFF2-40B4-BE49-F238E27FC236}">
+                <a16:creationId xmlns:a16="http://schemas.microsoft.com/office/drawing/2014/main" id="{F8426C71-F748-6BF2-A1F1-AB385FFF0316}"/>
+              </a:ext>
+            </a:extLst>
+          </p:cNvPr>
+          <p:cNvSpPr txBox="1"/>
+          <p:nvPr/>
+        </p:nvSpPr>
+        <p:spPr>
+          <a:xfrm>
+            <a:off x="1780162" y="92826"/>
+            <a:ext cx="8803532" cy="461665"/>
+          </a:xfrm>
+          <a:prstGeom prst="rect">
+            <a:avLst/>
+          </a:prstGeom>
+        </p:spPr>
+        <p:style>
+          <a:lnRef idx="2">
+            <a:schemeClr val="dk1"/>
+          </a:lnRef>
+          <a:fillRef idx="1">
+            <a:schemeClr val="lt1"/>
+          </a:fillRef>
+          <a:effectRef idx="0">
+            <a:schemeClr val="dk1"/>
+          </a:effectRef>
+          <a:fontRef idx="minor">
+            <a:schemeClr val="dk1"/>
+          </a:fontRef>
+        </p:style>
+        <p:txBody>
+          <a:bodyPr wrap="square">
+            <a:spAutoFit/>
+          </a:bodyPr>
+          <a:lstStyle/>
+          <a:p>
+            <a:pPr algn="ctr"/>
+            <a:r>
+              <a:rPr lang="en-US" sz="2400" b="1" dirty="0">
+                <a:latin typeface="Arial" panose="020B0604020202020204" pitchFamily="34" charset="0"/>
+              </a:rPr>
+              <a:t>Non-Valid values per column during and after the analysis</a:t>
+            </a:r>
+          </a:p>
+        </p:txBody>
+      </p:sp>
+      <p:pic>
+        <p:nvPicPr>
+          <p:cNvPr id="11" name="Imagen 10" descr="Un conjunto de letras blancas en un fondo blanco&#10;&#10;Descripción generada automáticamente con confianza media">
+            <a:extLst>
+              <a:ext uri="{FF2B5EF4-FFF2-40B4-BE49-F238E27FC236}">
+                <a16:creationId xmlns:a16="http://schemas.microsoft.com/office/drawing/2014/main" id="{1605704D-3E66-BD35-B04D-E3456C4268DC}"/>
+              </a:ext>
+            </a:extLst>
+          </p:cNvPr>
+          <p:cNvPicPr>
+            <a:picLocks noChangeAspect="1"/>
+          </p:cNvPicPr>
+          <p:nvPr/>
+        </p:nvPicPr>
+        <p:blipFill>
+          <a:blip r:embed="rId5">
+            <a:extLst>
+              <a:ext uri="{28A0092B-C50C-407E-A947-70E740481C1C}">
+                <a14:useLocalDpi xmlns:a14="http://schemas.microsoft.com/office/drawing/2010/main" val="0"/>
+              </a:ext>
+            </a:extLst>
+          </a:blip>
+          <a:stretch>
+            <a:fillRect/>
+          </a:stretch>
+        </p:blipFill>
+        <p:spPr>
+          <a:xfrm>
+            <a:off x="11012838" y="139959"/>
+            <a:ext cx="1075054" cy="1108767"/>
+          </a:xfrm>
+          <a:prstGeom prst="rect">
+            <a:avLst/>
+          </a:prstGeom>
+        </p:spPr>
+      </p:pic>
+      <p:pic>
+        <p:nvPicPr>
+          <p:cNvPr id="13" name="Imagen 12" descr="Gráfico, Histograma&#10;&#10;Descripción generada automáticamente">
+            <a:extLst>
+              <a:ext uri="{FF2B5EF4-FFF2-40B4-BE49-F238E27FC236}">
+                <a16:creationId xmlns:a16="http://schemas.microsoft.com/office/drawing/2014/main" id="{C7D83F2F-8536-FE9F-6810-CEE594828F0F}"/>
+              </a:ext>
+            </a:extLst>
+          </p:cNvPr>
+          <p:cNvPicPr>
+            <a:picLocks noChangeAspect="1"/>
+          </p:cNvPicPr>
+          <p:nvPr/>
+        </p:nvPicPr>
+        <p:blipFill>
+          <a:blip r:embed="rId6">
+            <a:extLst>
+              <a:ext uri="{28A0092B-C50C-407E-A947-70E740481C1C}">
+                <a14:useLocalDpi xmlns:a14="http://schemas.microsoft.com/office/drawing/2010/main" val="0"/>
+              </a:ext>
+            </a:extLst>
+          </a:blip>
+          <a:stretch>
+            <a:fillRect/>
+          </a:stretch>
+        </p:blipFill>
+        <p:spPr>
+          <a:xfrm>
+            <a:off x="7844775" y="1926546"/>
+            <a:ext cx="3836505" cy="3090518"/>
+          </a:xfrm>
+          <a:prstGeom prst="rect">
+            <a:avLst/>
+          </a:prstGeom>
+        </p:spPr>
+      </p:pic>
+      <p:sp>
+        <p:nvSpPr>
+          <p:cNvPr id="14" name="CuadroTexto 13">
+            <a:extLst>
+              <a:ext uri="{FF2B5EF4-FFF2-40B4-BE49-F238E27FC236}">
+                <a16:creationId xmlns:a16="http://schemas.microsoft.com/office/drawing/2014/main" id="{6A826930-AE12-F1C3-7C45-1CF415B7F9C5}"/>
+              </a:ext>
+            </a:extLst>
+          </p:cNvPr>
+          <p:cNvSpPr txBox="1"/>
+          <p:nvPr/>
+        </p:nvSpPr>
+        <p:spPr>
+          <a:xfrm>
+            <a:off x="108625" y="6389120"/>
+            <a:ext cx="2809673" cy="307777"/>
+          </a:xfrm>
+          <a:prstGeom prst="rect">
+            <a:avLst/>
+          </a:prstGeom>
+        </p:spPr>
+        <p:style>
+          <a:lnRef idx="2">
+            <a:schemeClr val="dk1"/>
+          </a:lnRef>
+          <a:fillRef idx="1">
+            <a:schemeClr val="lt1"/>
+          </a:fillRef>
+          <a:effectRef idx="0">
+            <a:schemeClr val="dk1"/>
+          </a:effectRef>
+          <a:fontRef idx="minor">
+            <a:schemeClr val="dk1"/>
+          </a:fontRef>
+        </p:style>
+        <p:txBody>
+          <a:bodyPr wrap="square">
+            <a:spAutoFit/>
+          </a:bodyPr>
+          <a:lstStyle/>
+          <a:p>
+            <a:pPr algn="ctr"/>
+            <a:r>
+              <a:rPr lang="en-US" sz="1400" b="1" i="0" dirty="0">
+                <a:effectLst/>
+                <a:latin typeface="Arial" panose="020B0604020202020204" pitchFamily="34" charset="0"/>
+              </a:rPr>
+              <a:t>DAVID MARTÍN CASERO</a:t>
+            </a:r>
+            <a:endParaRPr lang="en-US" sz="1400" b="1" dirty="0">
+              <a:latin typeface="Arial" panose="020B0604020202020204" pitchFamily="34" charset="0"/>
+            </a:endParaRPr>
+          </a:p>
+        </p:txBody>
+      </p:sp>
+    </p:spTree>
+    <p:extLst>
+      <p:ext uri="{BB962C8B-B14F-4D97-AF65-F5344CB8AC3E}">
+        <p14:creationId xmlns:p14="http://schemas.microsoft.com/office/powerpoint/2010/main" val="4129302560"/>
+      </p:ext>
+    </p:extLst>
+  </p:cSld>
+  <p:clrMapOvr>
+    <a:masterClrMapping/>
+  </p:clrMapOvr>
+</p:sld>
+</file>
+
+<file path=ppt/slides/slide3.xml><?xml version="1.0" encoding="utf-8"?>
 <p:sld xmlns:a="http://schemas.openxmlformats.org/drawingml/2006/main" xmlns:r="http://schemas.openxmlformats.org/officeDocument/2006/relationships" xmlns:p="http://schemas.openxmlformats.org/presentationml/2006/main">
   <p:cSld>
     <p:spTree>
@@ -5687,7 +6017,7 @@
 </p:sld>
 </file>
 
-<file path=ppt/slides/slide3.xml><?xml version="1.0" encoding="utf-8"?>
+<file path=ppt/slides/slide4.xml><?xml version="1.0" encoding="utf-8"?>
 <p:sld xmlns:a="http://schemas.openxmlformats.org/drawingml/2006/main" xmlns:r="http://schemas.openxmlformats.org/officeDocument/2006/relationships" xmlns:p="http://schemas.openxmlformats.org/presentationml/2006/main">
   <p:cSld>
     <p:spTree>
@@ -5706,78 +6036,6 @@
       </p:grpSpPr>
       <p:pic>
         <p:nvPicPr>
-          <p:cNvPr id="2" name="Imagen 1" descr="Gráfico&#10;&#10;Descripción generada automáticamente">
-            <a:extLst>
-              <a:ext uri="{FF2B5EF4-FFF2-40B4-BE49-F238E27FC236}">
-                <a16:creationId xmlns:a16="http://schemas.microsoft.com/office/drawing/2014/main" id="{8B168F45-3617-CA0A-B2C2-4E1791E20E2E}"/>
-              </a:ext>
-            </a:extLst>
-          </p:cNvPr>
-          <p:cNvPicPr>
-            <a:picLocks noChangeAspect="1"/>
-          </p:cNvPicPr>
-          <p:nvPr/>
-        </p:nvPicPr>
-        <p:blipFill>
-          <a:blip r:embed="rId2">
-            <a:extLst>
-              <a:ext uri="{28A0092B-C50C-407E-A947-70E740481C1C}">
-                <a14:useLocalDpi xmlns:a14="http://schemas.microsoft.com/office/drawing/2010/main" val="0"/>
-              </a:ext>
-            </a:extLst>
-          </a:blip>
-          <a:stretch>
-            <a:fillRect/>
-          </a:stretch>
-        </p:blipFill>
-        <p:spPr>
-          <a:xfrm>
-            <a:off x="216382" y="1454777"/>
-            <a:ext cx="3836504" cy="3071060"/>
-          </a:xfrm>
-          <a:prstGeom prst="rect">
-            <a:avLst/>
-          </a:prstGeom>
-        </p:spPr>
-      </p:pic>
-      <p:pic>
-        <p:nvPicPr>
-          <p:cNvPr id="3" name="Imagen 2" descr="Gráfico, Gráfico de barras&#10;&#10;Descripción generada automáticamente">
-            <a:extLst>
-              <a:ext uri="{FF2B5EF4-FFF2-40B4-BE49-F238E27FC236}">
-                <a16:creationId xmlns:a16="http://schemas.microsoft.com/office/drawing/2014/main" id="{13186CDC-C9BC-3820-241C-C523435D9FE6}"/>
-              </a:ext>
-            </a:extLst>
-          </p:cNvPr>
-          <p:cNvPicPr>
-            <a:picLocks noChangeAspect="1"/>
-          </p:cNvPicPr>
-          <p:nvPr/>
-        </p:nvPicPr>
-        <p:blipFill>
-          <a:blip r:embed="rId3">
-            <a:extLst>
-              <a:ext uri="{28A0092B-C50C-407E-A947-70E740481C1C}">
-                <a14:useLocalDpi xmlns:a14="http://schemas.microsoft.com/office/drawing/2010/main" val="0"/>
-              </a:ext>
-            </a:extLst>
-          </a:blip>
-          <a:stretch>
-            <a:fillRect/>
-          </a:stretch>
-        </p:blipFill>
-        <p:spPr>
-          <a:xfrm>
-            <a:off x="4084457" y="1454775"/>
-            <a:ext cx="3836504" cy="3080270"/>
-          </a:xfrm>
-          <a:prstGeom prst="rect">
-            <a:avLst/>
-          </a:prstGeom>
-        </p:spPr>
-      </p:pic>
-      <p:pic>
-        <p:nvPicPr>
           <p:cNvPr id="9" name="Picture 4" descr="Ironhack - Home | Facebook">
             <a:extLst>
               <a:ext uri="{FF2B5EF4-FFF2-40B4-BE49-F238E27FC236}">
@@ -5791,7 +6049,7 @@
           <p:nvPr/>
         </p:nvPicPr>
         <p:blipFill>
-          <a:blip r:embed="rId4">
+          <a:blip r:embed="rId2">
             <a:extLst>
               <a:ext uri="{28A0092B-C50C-407E-A947-70E740481C1C}">
                 <a14:useLocalDpi xmlns:a14="http://schemas.microsoft.com/office/drawing/2010/main" val="0"/>
@@ -5869,7 +6127,7 @@
               <a:rPr lang="en-US" sz="2400" b="1" dirty="0">
                 <a:latin typeface="Arial" panose="020B0604020202020204" pitchFamily="34" charset="0"/>
               </a:rPr>
-              <a:t>Unique values per column during and after the analysis</a:t>
+              <a:t>Count per activity carried out</a:t>
             </a:r>
           </a:p>
         </p:txBody>
@@ -5889,7 +6147,7 @@
           <p:nvPr/>
         </p:nvPicPr>
         <p:blipFill>
-          <a:blip r:embed="rId5">
+          <a:blip r:embed="rId3">
             <a:extLst>
               <a:ext uri="{28A0092B-C50C-407E-A947-70E740481C1C}">
                 <a14:useLocalDpi xmlns:a14="http://schemas.microsoft.com/office/drawing/2010/main" val="0"/>
@@ -5904,42 +6162,6 @@
           <a:xfrm>
             <a:off x="11012838" y="139959"/>
             <a:ext cx="1075054" cy="1108767"/>
-          </a:xfrm>
-          <a:prstGeom prst="rect">
-            <a:avLst/>
-          </a:prstGeom>
-        </p:spPr>
-      </p:pic>
-      <p:pic>
-        <p:nvPicPr>
-          <p:cNvPr id="13" name="Imagen 12" descr="Gráfico, Histograma&#10;&#10;Descripción generada automáticamente">
-            <a:extLst>
-              <a:ext uri="{FF2B5EF4-FFF2-40B4-BE49-F238E27FC236}">
-                <a16:creationId xmlns:a16="http://schemas.microsoft.com/office/drawing/2014/main" id="{C7D83F2F-8536-FE9F-6810-CEE594828F0F}"/>
-              </a:ext>
-            </a:extLst>
-          </p:cNvPr>
-          <p:cNvPicPr>
-            <a:picLocks noChangeAspect="1"/>
-          </p:cNvPicPr>
-          <p:nvPr/>
-        </p:nvPicPr>
-        <p:blipFill>
-          <a:blip r:embed="rId6">
-            <a:extLst>
-              <a:ext uri="{28A0092B-C50C-407E-A947-70E740481C1C}">
-                <a14:useLocalDpi xmlns:a14="http://schemas.microsoft.com/office/drawing/2010/main" val="0"/>
-              </a:ext>
-            </a:extLst>
-          </a:blip>
-          <a:stretch>
-            <a:fillRect/>
-          </a:stretch>
-        </p:blipFill>
-        <p:spPr>
-          <a:xfrm>
-            <a:off x="7952532" y="1454776"/>
-            <a:ext cx="3836505" cy="3090518"/>
           </a:xfrm>
           <a:prstGeom prst="rect">
             <a:avLst/>
@@ -6001,231 +6223,12 @@
           </a:p>
         </p:txBody>
       </p:sp>
-    </p:spTree>
-    <p:extLst>
-      <p:ext uri="{BB962C8B-B14F-4D97-AF65-F5344CB8AC3E}">
-        <p14:creationId xmlns:p14="http://schemas.microsoft.com/office/powerpoint/2010/main" val="4129302560"/>
-      </p:ext>
-    </p:extLst>
-  </p:cSld>
-  <p:clrMapOvr>
-    <a:masterClrMapping/>
-  </p:clrMapOvr>
-</p:sld>
-</file>
-
-<file path=ppt/slides/slide4.xml><?xml version="1.0" encoding="utf-8"?>
-<p:sld xmlns:a="http://schemas.openxmlformats.org/drawingml/2006/main" xmlns:r="http://schemas.openxmlformats.org/officeDocument/2006/relationships" xmlns:p="http://schemas.openxmlformats.org/presentationml/2006/main">
-  <p:cSld>
-    <p:spTree>
-      <p:nvGrpSpPr>
-        <p:cNvPr id="1" name=""/>
-        <p:cNvGrpSpPr/>
-        <p:nvPr/>
-      </p:nvGrpSpPr>
-      <p:grpSpPr>
-        <a:xfrm>
-          <a:off x="0" y="0"/>
-          <a:ext cx="0" cy="0"/>
-          <a:chOff x="0" y="0"/>
-          <a:chExt cx="0" cy="0"/>
-        </a:xfrm>
-      </p:grpSpPr>
       <p:pic>
         <p:nvPicPr>
-          <p:cNvPr id="9" name="Picture 4" descr="Ironhack - Home | Facebook">
-            <a:extLst>
-              <a:ext uri="{FF2B5EF4-FFF2-40B4-BE49-F238E27FC236}">
-                <a16:creationId xmlns:a16="http://schemas.microsoft.com/office/drawing/2014/main" id="{24480A59-E6B8-A736-0948-4C719F0F3A8C}"/>
-              </a:ext>
-            </a:extLst>
-          </p:cNvPr>
-          <p:cNvPicPr>
-            <a:picLocks noChangeAspect="1" noChangeArrowheads="1"/>
-          </p:cNvPicPr>
-          <p:nvPr/>
-        </p:nvPicPr>
-        <p:blipFill>
-          <a:blip r:embed="rId2">
-            <a:extLst>
-              <a:ext uri="{28A0092B-C50C-407E-A947-70E740481C1C}">
-                <a14:useLocalDpi xmlns:a14="http://schemas.microsoft.com/office/drawing/2010/main" val="0"/>
-              </a:ext>
-            </a:extLst>
-          </a:blip>
-          <a:srcRect/>
-          <a:stretch>
-            <a:fillRect/>
-          </a:stretch>
-        </p:blipFill>
-        <p:spPr bwMode="auto">
-          <a:xfrm>
-            <a:off x="-1" y="55740"/>
-            <a:ext cx="1325587" cy="1325587"/>
-          </a:xfrm>
-          <a:prstGeom prst="rect">
-            <a:avLst/>
-          </a:prstGeom>
-          <a:noFill/>
-          <a:extLst>
-            <a:ext uri="{909E8E84-426E-40DD-AFC4-6F175D3DCCD1}">
-              <a14:hiddenFill xmlns:a14="http://schemas.microsoft.com/office/drawing/2010/main">
-                <a:solidFill>
-                  <a:srgbClr val="FFFFFF"/>
-                </a:solidFill>
-              </a14:hiddenFill>
-            </a:ext>
-          </a:extLst>
-        </p:spPr>
-      </p:pic>
-      <p:sp>
-        <p:nvSpPr>
-          <p:cNvPr id="10" name="CuadroTexto 9">
-            <a:extLst>
-              <a:ext uri="{FF2B5EF4-FFF2-40B4-BE49-F238E27FC236}">
-                <a16:creationId xmlns:a16="http://schemas.microsoft.com/office/drawing/2014/main" id="{F8426C71-F748-6BF2-A1F1-AB385FFF0316}"/>
-              </a:ext>
-            </a:extLst>
-          </p:cNvPr>
-          <p:cNvSpPr txBox="1"/>
-          <p:nvPr/>
-        </p:nvSpPr>
-        <p:spPr>
-          <a:xfrm>
-            <a:off x="1780162" y="92826"/>
-            <a:ext cx="8803532" cy="461665"/>
-          </a:xfrm>
-          <a:prstGeom prst="rect">
-            <a:avLst/>
-          </a:prstGeom>
-        </p:spPr>
-        <p:style>
-          <a:lnRef idx="2">
-            <a:schemeClr val="dk1"/>
-          </a:lnRef>
-          <a:fillRef idx="1">
-            <a:schemeClr val="lt1"/>
-          </a:fillRef>
-          <a:effectRef idx="0">
-            <a:schemeClr val="dk1"/>
-          </a:effectRef>
-          <a:fontRef idx="minor">
-            <a:schemeClr val="dk1"/>
-          </a:fontRef>
-        </p:style>
-        <p:txBody>
-          <a:bodyPr wrap="square">
-            <a:spAutoFit/>
-          </a:bodyPr>
-          <a:lstStyle/>
-          <a:p>
-            <a:pPr algn="ctr"/>
-            <a:r>
-              <a:rPr lang="en-US" sz="2400" b="1" dirty="0">
-                <a:latin typeface="Arial" panose="020B0604020202020204" pitchFamily="34" charset="0"/>
-              </a:rPr>
-              <a:t>Count values per column</a:t>
-            </a:r>
-          </a:p>
-        </p:txBody>
-      </p:sp>
-      <p:pic>
-        <p:nvPicPr>
-          <p:cNvPr id="11" name="Imagen 10" descr="Un conjunto de letras blancas en un fondo blanco&#10;&#10;Descripción generada automáticamente con confianza media">
-            <a:extLst>
-              <a:ext uri="{FF2B5EF4-FFF2-40B4-BE49-F238E27FC236}">
-                <a16:creationId xmlns:a16="http://schemas.microsoft.com/office/drawing/2014/main" id="{1605704D-3E66-BD35-B04D-E3456C4268DC}"/>
-              </a:ext>
-            </a:extLst>
-          </p:cNvPr>
-          <p:cNvPicPr>
-            <a:picLocks noChangeAspect="1"/>
-          </p:cNvPicPr>
-          <p:nvPr/>
-        </p:nvPicPr>
-        <p:blipFill>
-          <a:blip r:embed="rId3">
-            <a:extLst>
-              <a:ext uri="{28A0092B-C50C-407E-A947-70E740481C1C}">
-                <a14:useLocalDpi xmlns:a14="http://schemas.microsoft.com/office/drawing/2010/main" val="0"/>
-              </a:ext>
-            </a:extLst>
-          </a:blip>
-          <a:stretch>
-            <a:fillRect/>
-          </a:stretch>
-        </p:blipFill>
-        <p:spPr>
-          <a:xfrm>
-            <a:off x="11012838" y="139959"/>
-            <a:ext cx="1075054" cy="1108767"/>
-          </a:xfrm>
-          <a:prstGeom prst="rect">
-            <a:avLst/>
-          </a:prstGeom>
-        </p:spPr>
-      </p:pic>
-      <p:sp>
-        <p:nvSpPr>
-          <p:cNvPr id="14" name="CuadroTexto 13">
-            <a:extLst>
-              <a:ext uri="{FF2B5EF4-FFF2-40B4-BE49-F238E27FC236}">
-                <a16:creationId xmlns:a16="http://schemas.microsoft.com/office/drawing/2014/main" id="{6A826930-AE12-F1C3-7C45-1CF415B7F9C5}"/>
-              </a:ext>
-            </a:extLst>
-          </p:cNvPr>
-          <p:cNvSpPr txBox="1"/>
-          <p:nvPr/>
-        </p:nvSpPr>
-        <p:spPr>
-          <a:xfrm>
-            <a:off x="108625" y="6389120"/>
-            <a:ext cx="2809673" cy="307777"/>
-          </a:xfrm>
-          <a:prstGeom prst="rect">
-            <a:avLst/>
-          </a:prstGeom>
-        </p:spPr>
-        <p:style>
-          <a:lnRef idx="2">
-            <a:schemeClr val="dk1"/>
-          </a:lnRef>
-          <a:fillRef idx="1">
-            <a:schemeClr val="lt1"/>
-          </a:fillRef>
-          <a:effectRef idx="0">
-            <a:schemeClr val="dk1"/>
-          </a:effectRef>
-          <a:fontRef idx="minor">
-            <a:schemeClr val="dk1"/>
-          </a:fontRef>
-        </p:style>
-        <p:txBody>
-          <a:bodyPr wrap="square">
-            <a:spAutoFit/>
-          </a:bodyPr>
-          <a:lstStyle/>
-          <a:p>
-            <a:pPr algn="ctr"/>
-            <a:r>
-              <a:rPr lang="en-US" sz="1400" b="1" i="0" dirty="0">
-                <a:effectLst/>
-                <a:latin typeface="Arial" panose="020B0604020202020204" pitchFamily="34" charset="0"/>
-              </a:rPr>
-              <a:t>DAVID MARTÍN CASERO</a:t>
-            </a:r>
-            <a:endParaRPr lang="en-US" sz="1400" b="1" dirty="0">
-              <a:latin typeface="Arial" panose="020B0604020202020204" pitchFamily="34" charset="0"/>
-            </a:endParaRPr>
-          </a:p>
-        </p:txBody>
-      </p:sp>
-      <p:pic>
-        <p:nvPicPr>
-          <p:cNvPr id="5" name="Imagen 4">
-            <a:extLst>
-              <a:ext uri="{FF2B5EF4-FFF2-40B4-BE49-F238E27FC236}">
-                <a16:creationId xmlns:a16="http://schemas.microsoft.com/office/drawing/2014/main" id="{1C65F290-07F6-DE05-48BA-9D9C9C2C8C29}"/>
+          <p:cNvPr id="3" name="Imagen 2">
+            <a:extLst>
+              <a:ext uri="{FF2B5EF4-FFF2-40B4-BE49-F238E27FC236}">
+                <a16:creationId xmlns:a16="http://schemas.microsoft.com/office/drawing/2014/main" id="{88485F24-09A4-43B3-7017-F169A4223741}"/>
               </a:ext>
             </a:extLst>
           </p:cNvPr>
@@ -6242,38 +6245,8 @@
         </p:blipFill>
         <p:spPr>
           <a:xfrm>
-            <a:off x="108625" y="2126339"/>
-            <a:ext cx="3629025" cy="2362200"/>
-          </a:xfrm>
-          <a:prstGeom prst="rect">
-            <a:avLst/>
-          </a:prstGeom>
-        </p:spPr>
-      </p:pic>
-      <p:pic>
-        <p:nvPicPr>
-          <p:cNvPr id="7" name="Imagen 6">
-            <a:extLst>
-              <a:ext uri="{FF2B5EF4-FFF2-40B4-BE49-F238E27FC236}">
-                <a16:creationId xmlns:a16="http://schemas.microsoft.com/office/drawing/2014/main" id="{E5E8204D-7B70-A418-236C-D7D3B62C2278}"/>
-              </a:ext>
-            </a:extLst>
-          </p:cNvPr>
-          <p:cNvPicPr>
-            <a:picLocks noChangeAspect="1"/>
-          </p:cNvPicPr>
-          <p:nvPr/>
-        </p:nvPicPr>
-        <p:blipFill>
-          <a:blip r:embed="rId5"/>
-          <a:stretch>
-            <a:fillRect/>
-          </a:stretch>
-        </p:blipFill>
-        <p:spPr>
-          <a:xfrm>
-            <a:off x="3917918" y="1545555"/>
-            <a:ext cx="8085040" cy="4355624"/>
+            <a:off x="1325586" y="845570"/>
+            <a:ext cx="9010650" cy="5543550"/>
           </a:xfrm>
           <a:prstGeom prst="rect">
             <a:avLst/>
@@ -6283,7 +6256,7 @@
     </p:spTree>
     <p:extLst>
       <p:ext uri="{BB962C8B-B14F-4D97-AF65-F5344CB8AC3E}">
-        <p14:creationId xmlns:p14="http://schemas.microsoft.com/office/powerpoint/2010/main" val="10057321"/>
+        <p14:creationId xmlns:p14="http://schemas.microsoft.com/office/powerpoint/2010/main" val="38616036"/>
       </p:ext>
     </p:extLst>
   </p:cSld>
@@ -6403,7 +6376,7 @@
               <a:rPr lang="en-US" sz="2400" b="1" dirty="0">
                 <a:latin typeface="Arial" panose="020B0604020202020204" pitchFamily="34" charset="0"/>
               </a:rPr>
-              <a:t>Count per country</a:t>
+              <a:t>Count attacks per species</a:t>
             </a:r>
           </a:p>
         </p:txBody>
@@ -6501,10 +6474,10 @@
       </p:sp>
       <p:pic>
         <p:nvPicPr>
-          <p:cNvPr id="3" name="Imagen 2">
-            <a:extLst>
-              <a:ext uri="{FF2B5EF4-FFF2-40B4-BE49-F238E27FC236}">
-                <a16:creationId xmlns:a16="http://schemas.microsoft.com/office/drawing/2014/main" id="{88FCCC0D-1CC4-DD3C-7954-11E7756C8FD9}"/>
+          <p:cNvPr id="6" name="Imagen 5">
+            <a:extLst>
+              <a:ext uri="{FF2B5EF4-FFF2-40B4-BE49-F238E27FC236}">
+                <a16:creationId xmlns:a16="http://schemas.microsoft.com/office/drawing/2014/main" id="{B7EB5B3A-493A-F62B-1293-B1B9021E66DC}"/>
               </a:ext>
             </a:extLst>
           </p:cNvPr>
@@ -6521,20 +6494,148 @@
         </p:blipFill>
         <p:spPr>
           <a:xfrm>
-            <a:off x="415135" y="1457792"/>
-            <a:ext cx="6930491" cy="4443387"/>
+            <a:off x="1780162" y="1248726"/>
+            <a:ext cx="8534985" cy="5094287"/>
           </a:xfrm>
           <a:prstGeom prst="rect">
             <a:avLst/>
           </a:prstGeom>
         </p:spPr>
       </p:pic>
+    </p:spTree>
+    <p:extLst>
+      <p:ext uri="{BB962C8B-B14F-4D97-AF65-F5344CB8AC3E}">
+        <p14:creationId xmlns:p14="http://schemas.microsoft.com/office/powerpoint/2010/main" val="2651823316"/>
+      </p:ext>
+    </p:extLst>
+  </p:cSld>
+  <p:clrMapOvr>
+    <a:masterClrMapping/>
+  </p:clrMapOvr>
+</p:sld>
+</file>
+
+<file path=ppt/slides/slide6.xml><?xml version="1.0" encoding="utf-8"?>
+<p:sld xmlns:a="http://schemas.openxmlformats.org/drawingml/2006/main" xmlns:r="http://schemas.openxmlformats.org/officeDocument/2006/relationships" xmlns:p="http://schemas.openxmlformats.org/presentationml/2006/main">
+  <p:cSld>
+    <p:spTree>
+      <p:nvGrpSpPr>
+        <p:cNvPr id="1" name=""/>
+        <p:cNvGrpSpPr/>
+        <p:nvPr/>
+      </p:nvGrpSpPr>
+      <p:grpSpPr>
+        <a:xfrm>
+          <a:off x="0" y="0"/>
+          <a:ext cx="0" cy="0"/>
+          <a:chOff x="0" y="0"/>
+          <a:chExt cx="0" cy="0"/>
+        </a:xfrm>
+      </p:grpSpPr>
       <p:pic>
         <p:nvPicPr>
-          <p:cNvPr id="6" name="Imagen 5">
-            <a:extLst>
-              <a:ext uri="{FF2B5EF4-FFF2-40B4-BE49-F238E27FC236}">
-                <a16:creationId xmlns:a16="http://schemas.microsoft.com/office/drawing/2014/main" id="{C2B483DC-7180-15CD-C409-D9FC697660B1}"/>
+          <p:cNvPr id="9" name="Picture 4" descr="Ironhack - Home | Facebook">
+            <a:extLst>
+              <a:ext uri="{FF2B5EF4-FFF2-40B4-BE49-F238E27FC236}">
+                <a16:creationId xmlns:a16="http://schemas.microsoft.com/office/drawing/2014/main" id="{24480A59-E6B8-A736-0948-4C719F0F3A8C}"/>
+              </a:ext>
+            </a:extLst>
+          </p:cNvPr>
+          <p:cNvPicPr>
+            <a:picLocks noChangeAspect="1" noChangeArrowheads="1"/>
+          </p:cNvPicPr>
+          <p:nvPr/>
+        </p:nvPicPr>
+        <p:blipFill>
+          <a:blip r:embed="rId2">
+            <a:extLst>
+              <a:ext uri="{28A0092B-C50C-407E-A947-70E740481C1C}">
+                <a14:useLocalDpi xmlns:a14="http://schemas.microsoft.com/office/drawing/2010/main" val="0"/>
+              </a:ext>
+            </a:extLst>
+          </a:blip>
+          <a:srcRect/>
+          <a:stretch>
+            <a:fillRect/>
+          </a:stretch>
+        </p:blipFill>
+        <p:spPr bwMode="auto">
+          <a:xfrm>
+            <a:off x="-1" y="55740"/>
+            <a:ext cx="1325587" cy="1325587"/>
+          </a:xfrm>
+          <a:prstGeom prst="rect">
+            <a:avLst/>
+          </a:prstGeom>
+          <a:noFill/>
+          <a:extLst>
+            <a:ext uri="{909E8E84-426E-40DD-AFC4-6F175D3DCCD1}">
+              <a14:hiddenFill xmlns:a14="http://schemas.microsoft.com/office/drawing/2010/main">
+                <a:solidFill>
+                  <a:srgbClr val="FFFFFF"/>
+                </a:solidFill>
+              </a14:hiddenFill>
+            </a:ext>
+          </a:extLst>
+        </p:spPr>
+      </p:pic>
+      <p:sp>
+        <p:nvSpPr>
+          <p:cNvPr id="10" name="CuadroTexto 9">
+            <a:extLst>
+              <a:ext uri="{FF2B5EF4-FFF2-40B4-BE49-F238E27FC236}">
+                <a16:creationId xmlns:a16="http://schemas.microsoft.com/office/drawing/2014/main" id="{F8426C71-F748-6BF2-A1F1-AB385FFF0316}"/>
+              </a:ext>
+            </a:extLst>
+          </p:cNvPr>
+          <p:cNvSpPr txBox="1"/>
+          <p:nvPr/>
+        </p:nvSpPr>
+        <p:spPr>
+          <a:xfrm>
+            <a:off x="1780162" y="92826"/>
+            <a:ext cx="8803532" cy="461665"/>
+          </a:xfrm>
+          <a:prstGeom prst="rect">
+            <a:avLst/>
+          </a:prstGeom>
+        </p:spPr>
+        <p:style>
+          <a:lnRef idx="2">
+            <a:schemeClr val="dk1"/>
+          </a:lnRef>
+          <a:fillRef idx="1">
+            <a:schemeClr val="lt1"/>
+          </a:fillRef>
+          <a:effectRef idx="0">
+            <a:schemeClr val="dk1"/>
+          </a:effectRef>
+          <a:fontRef idx="minor">
+            <a:schemeClr val="dk1"/>
+          </a:fontRef>
+        </p:style>
+        <p:txBody>
+          <a:bodyPr wrap="square">
+            <a:spAutoFit/>
+          </a:bodyPr>
+          <a:lstStyle/>
+          <a:p>
+            <a:pPr algn="ctr"/>
+            <a:r>
+              <a:rPr lang="en-US" sz="2400" b="1" dirty="0">
+                <a:latin typeface="Arial" panose="020B0604020202020204" pitchFamily="34" charset="0"/>
+              </a:rPr>
+              <a:t>Attacks per species and if fatal or not</a:t>
+            </a:r>
+          </a:p>
+        </p:txBody>
+      </p:sp>
+      <p:pic>
+        <p:nvPicPr>
+          <p:cNvPr id="11" name="Imagen 10" descr="Un conjunto de letras blancas en un fondo blanco&#10;&#10;Descripción generada automáticamente con confianza media">
+            <a:extLst>
+              <a:ext uri="{FF2B5EF4-FFF2-40B4-BE49-F238E27FC236}">
+                <a16:creationId xmlns:a16="http://schemas.microsoft.com/office/drawing/2014/main" id="{1605704D-3E66-BD35-B04D-E3456C4268DC}"/>
               </a:ext>
             </a:extLst>
           </p:cNvPr>
@@ -6544,15 +6645,355 @@
           <p:nvPr/>
         </p:nvPicPr>
         <p:blipFill>
-          <a:blip r:embed="rId5"/>
+          <a:blip r:embed="rId3">
+            <a:extLst>
+              <a:ext uri="{28A0092B-C50C-407E-A947-70E740481C1C}">
+                <a14:useLocalDpi xmlns:a14="http://schemas.microsoft.com/office/drawing/2010/main" val="0"/>
+              </a:ext>
+            </a:extLst>
+          </a:blip>
           <a:stretch>
             <a:fillRect/>
           </a:stretch>
         </p:blipFill>
         <p:spPr>
           <a:xfrm>
-            <a:off x="7345626" y="1815335"/>
-            <a:ext cx="4518262" cy="3227330"/>
+            <a:off x="11012838" y="139959"/>
+            <a:ext cx="1075054" cy="1108767"/>
+          </a:xfrm>
+          <a:prstGeom prst="rect">
+            <a:avLst/>
+          </a:prstGeom>
+        </p:spPr>
+      </p:pic>
+      <p:sp>
+        <p:nvSpPr>
+          <p:cNvPr id="14" name="CuadroTexto 13">
+            <a:extLst>
+              <a:ext uri="{FF2B5EF4-FFF2-40B4-BE49-F238E27FC236}">
+                <a16:creationId xmlns:a16="http://schemas.microsoft.com/office/drawing/2014/main" id="{6A826930-AE12-F1C3-7C45-1CF415B7F9C5}"/>
+              </a:ext>
+            </a:extLst>
+          </p:cNvPr>
+          <p:cNvSpPr txBox="1"/>
+          <p:nvPr/>
+        </p:nvSpPr>
+        <p:spPr>
+          <a:xfrm>
+            <a:off x="108625" y="6389120"/>
+            <a:ext cx="2809673" cy="307777"/>
+          </a:xfrm>
+          <a:prstGeom prst="rect">
+            <a:avLst/>
+          </a:prstGeom>
+        </p:spPr>
+        <p:style>
+          <a:lnRef idx="2">
+            <a:schemeClr val="dk1"/>
+          </a:lnRef>
+          <a:fillRef idx="1">
+            <a:schemeClr val="lt1"/>
+          </a:fillRef>
+          <a:effectRef idx="0">
+            <a:schemeClr val="dk1"/>
+          </a:effectRef>
+          <a:fontRef idx="minor">
+            <a:schemeClr val="dk1"/>
+          </a:fontRef>
+        </p:style>
+        <p:txBody>
+          <a:bodyPr wrap="square">
+            <a:spAutoFit/>
+          </a:bodyPr>
+          <a:lstStyle/>
+          <a:p>
+            <a:pPr algn="ctr"/>
+            <a:r>
+              <a:rPr lang="en-US" sz="1400" b="1" i="0" dirty="0">
+                <a:effectLst/>
+                <a:latin typeface="Arial" panose="020B0604020202020204" pitchFamily="34" charset="0"/>
+              </a:rPr>
+              <a:t>DAVID MARTÍN CASERO</a:t>
+            </a:r>
+            <a:endParaRPr lang="en-US" sz="1400" b="1" dirty="0">
+              <a:latin typeface="Arial" panose="020B0604020202020204" pitchFamily="34" charset="0"/>
+            </a:endParaRPr>
+          </a:p>
+        </p:txBody>
+      </p:sp>
+      <p:pic>
+        <p:nvPicPr>
+          <p:cNvPr id="12" name="Imagen 11">
+            <a:extLst>
+              <a:ext uri="{FF2B5EF4-FFF2-40B4-BE49-F238E27FC236}">
+                <a16:creationId xmlns:a16="http://schemas.microsoft.com/office/drawing/2014/main" id="{0D4C8DF3-F3C4-7012-634E-6E95D58D8F39}"/>
+              </a:ext>
+            </a:extLst>
+          </p:cNvPr>
+          <p:cNvPicPr>
+            <a:picLocks noChangeAspect="1"/>
+          </p:cNvPicPr>
+          <p:nvPr/>
+        </p:nvPicPr>
+        <p:blipFill>
+          <a:blip r:embed="rId4"/>
+          <a:stretch>
+            <a:fillRect/>
+          </a:stretch>
+        </p:blipFill>
+        <p:spPr>
+          <a:xfrm>
+            <a:off x="3006925" y="694342"/>
+            <a:ext cx="7083124" cy="5932436"/>
+          </a:xfrm>
+          <a:prstGeom prst="rect">
+            <a:avLst/>
+          </a:prstGeom>
+        </p:spPr>
+      </p:pic>
+    </p:spTree>
+    <p:extLst>
+      <p:ext uri="{BB962C8B-B14F-4D97-AF65-F5344CB8AC3E}">
+        <p14:creationId xmlns:p14="http://schemas.microsoft.com/office/powerpoint/2010/main" val="10057321"/>
+      </p:ext>
+    </p:extLst>
+  </p:cSld>
+  <p:clrMapOvr>
+    <a:masterClrMapping/>
+  </p:clrMapOvr>
+</p:sld>
+</file>
+
+<file path=ppt/slides/slide7.xml><?xml version="1.0" encoding="utf-8"?>
+<p:sld xmlns:a="http://schemas.openxmlformats.org/drawingml/2006/main" xmlns:r="http://schemas.openxmlformats.org/officeDocument/2006/relationships" xmlns:p="http://schemas.openxmlformats.org/presentationml/2006/main">
+  <p:cSld>
+    <p:spTree>
+      <p:nvGrpSpPr>
+        <p:cNvPr id="1" name=""/>
+        <p:cNvGrpSpPr/>
+        <p:nvPr/>
+      </p:nvGrpSpPr>
+      <p:grpSpPr>
+        <a:xfrm>
+          <a:off x="0" y="0"/>
+          <a:ext cx="0" cy="0"/>
+          <a:chOff x="0" y="0"/>
+          <a:chExt cx="0" cy="0"/>
+        </a:xfrm>
+      </p:grpSpPr>
+      <p:pic>
+        <p:nvPicPr>
+          <p:cNvPr id="9" name="Picture 4" descr="Ironhack - Home | Facebook">
+            <a:extLst>
+              <a:ext uri="{FF2B5EF4-FFF2-40B4-BE49-F238E27FC236}">
+                <a16:creationId xmlns:a16="http://schemas.microsoft.com/office/drawing/2014/main" id="{24480A59-E6B8-A736-0948-4C719F0F3A8C}"/>
+              </a:ext>
+            </a:extLst>
+          </p:cNvPr>
+          <p:cNvPicPr>
+            <a:picLocks noChangeAspect="1" noChangeArrowheads="1"/>
+          </p:cNvPicPr>
+          <p:nvPr/>
+        </p:nvPicPr>
+        <p:blipFill>
+          <a:blip r:embed="rId2">
+            <a:extLst>
+              <a:ext uri="{28A0092B-C50C-407E-A947-70E740481C1C}">
+                <a14:useLocalDpi xmlns:a14="http://schemas.microsoft.com/office/drawing/2010/main" val="0"/>
+              </a:ext>
+            </a:extLst>
+          </a:blip>
+          <a:srcRect/>
+          <a:stretch>
+            <a:fillRect/>
+          </a:stretch>
+        </p:blipFill>
+        <p:spPr bwMode="auto">
+          <a:xfrm>
+            <a:off x="-1" y="55740"/>
+            <a:ext cx="1325587" cy="1325587"/>
+          </a:xfrm>
+          <a:prstGeom prst="rect">
+            <a:avLst/>
+          </a:prstGeom>
+          <a:noFill/>
+          <a:extLst>
+            <a:ext uri="{909E8E84-426E-40DD-AFC4-6F175D3DCCD1}">
+              <a14:hiddenFill xmlns:a14="http://schemas.microsoft.com/office/drawing/2010/main">
+                <a:solidFill>
+                  <a:srgbClr val="FFFFFF"/>
+                </a:solidFill>
+              </a14:hiddenFill>
+            </a:ext>
+          </a:extLst>
+        </p:spPr>
+      </p:pic>
+      <p:sp>
+        <p:nvSpPr>
+          <p:cNvPr id="10" name="CuadroTexto 9">
+            <a:extLst>
+              <a:ext uri="{FF2B5EF4-FFF2-40B4-BE49-F238E27FC236}">
+                <a16:creationId xmlns:a16="http://schemas.microsoft.com/office/drawing/2014/main" id="{F8426C71-F748-6BF2-A1F1-AB385FFF0316}"/>
+              </a:ext>
+            </a:extLst>
+          </p:cNvPr>
+          <p:cNvSpPr txBox="1"/>
+          <p:nvPr/>
+        </p:nvSpPr>
+        <p:spPr>
+          <a:xfrm>
+            <a:off x="1780162" y="92826"/>
+            <a:ext cx="8803532" cy="461665"/>
+          </a:xfrm>
+          <a:prstGeom prst="rect">
+            <a:avLst/>
+          </a:prstGeom>
+        </p:spPr>
+        <p:style>
+          <a:lnRef idx="2">
+            <a:schemeClr val="dk1"/>
+          </a:lnRef>
+          <a:fillRef idx="1">
+            <a:schemeClr val="lt1"/>
+          </a:fillRef>
+          <a:effectRef idx="0">
+            <a:schemeClr val="dk1"/>
+          </a:effectRef>
+          <a:fontRef idx="minor">
+            <a:schemeClr val="dk1"/>
+          </a:fontRef>
+        </p:style>
+        <p:txBody>
+          <a:bodyPr wrap="square">
+            <a:spAutoFit/>
+          </a:bodyPr>
+          <a:lstStyle/>
+          <a:p>
+            <a:pPr algn="ctr"/>
+            <a:r>
+              <a:rPr lang="en-US" sz="2400" b="1" dirty="0">
+                <a:latin typeface="Arial" panose="020B0604020202020204" pitchFamily="34" charset="0"/>
+              </a:rPr>
+              <a:t>Count per age range</a:t>
+            </a:r>
+          </a:p>
+        </p:txBody>
+      </p:sp>
+      <p:pic>
+        <p:nvPicPr>
+          <p:cNvPr id="11" name="Imagen 10" descr="Un conjunto de letras blancas en un fondo blanco&#10;&#10;Descripción generada automáticamente con confianza media">
+            <a:extLst>
+              <a:ext uri="{FF2B5EF4-FFF2-40B4-BE49-F238E27FC236}">
+                <a16:creationId xmlns:a16="http://schemas.microsoft.com/office/drawing/2014/main" id="{1605704D-3E66-BD35-B04D-E3456C4268DC}"/>
+              </a:ext>
+            </a:extLst>
+          </p:cNvPr>
+          <p:cNvPicPr>
+            <a:picLocks noChangeAspect="1"/>
+          </p:cNvPicPr>
+          <p:nvPr/>
+        </p:nvPicPr>
+        <p:blipFill>
+          <a:blip r:embed="rId3">
+            <a:extLst>
+              <a:ext uri="{28A0092B-C50C-407E-A947-70E740481C1C}">
+                <a14:useLocalDpi xmlns:a14="http://schemas.microsoft.com/office/drawing/2010/main" val="0"/>
+              </a:ext>
+            </a:extLst>
+          </a:blip>
+          <a:stretch>
+            <a:fillRect/>
+          </a:stretch>
+        </p:blipFill>
+        <p:spPr>
+          <a:xfrm>
+            <a:off x="11012838" y="139959"/>
+            <a:ext cx="1075054" cy="1108767"/>
+          </a:xfrm>
+          <a:prstGeom prst="rect">
+            <a:avLst/>
+          </a:prstGeom>
+        </p:spPr>
+      </p:pic>
+      <p:sp>
+        <p:nvSpPr>
+          <p:cNvPr id="14" name="CuadroTexto 13">
+            <a:extLst>
+              <a:ext uri="{FF2B5EF4-FFF2-40B4-BE49-F238E27FC236}">
+                <a16:creationId xmlns:a16="http://schemas.microsoft.com/office/drawing/2014/main" id="{6A826930-AE12-F1C3-7C45-1CF415B7F9C5}"/>
+              </a:ext>
+            </a:extLst>
+          </p:cNvPr>
+          <p:cNvSpPr txBox="1"/>
+          <p:nvPr/>
+        </p:nvSpPr>
+        <p:spPr>
+          <a:xfrm>
+            <a:off x="108625" y="6389120"/>
+            <a:ext cx="2809673" cy="307777"/>
+          </a:xfrm>
+          <a:prstGeom prst="rect">
+            <a:avLst/>
+          </a:prstGeom>
+        </p:spPr>
+        <p:style>
+          <a:lnRef idx="2">
+            <a:schemeClr val="dk1"/>
+          </a:lnRef>
+          <a:fillRef idx="1">
+            <a:schemeClr val="lt1"/>
+          </a:fillRef>
+          <a:effectRef idx="0">
+            <a:schemeClr val="dk1"/>
+          </a:effectRef>
+          <a:fontRef idx="minor">
+            <a:schemeClr val="dk1"/>
+          </a:fontRef>
+        </p:style>
+        <p:txBody>
+          <a:bodyPr wrap="square">
+            <a:spAutoFit/>
+          </a:bodyPr>
+          <a:lstStyle/>
+          <a:p>
+            <a:pPr algn="ctr"/>
+            <a:r>
+              <a:rPr lang="en-US" sz="1400" b="1" i="0" dirty="0">
+                <a:effectLst/>
+                <a:latin typeface="Arial" panose="020B0604020202020204" pitchFamily="34" charset="0"/>
+              </a:rPr>
+              <a:t>DAVID MARTÍN CASERO</a:t>
+            </a:r>
+            <a:endParaRPr lang="en-US" sz="1400" b="1" dirty="0">
+              <a:latin typeface="Arial" panose="020B0604020202020204" pitchFamily="34" charset="0"/>
+            </a:endParaRPr>
+          </a:p>
+        </p:txBody>
+      </p:sp>
+      <p:pic>
+        <p:nvPicPr>
+          <p:cNvPr id="13" name="Imagen 12">
+            <a:extLst>
+              <a:ext uri="{FF2B5EF4-FFF2-40B4-BE49-F238E27FC236}">
+                <a16:creationId xmlns:a16="http://schemas.microsoft.com/office/drawing/2014/main" id="{85E81117-88DB-EB39-EB2E-5A3A3D277B4C}"/>
+              </a:ext>
+            </a:extLst>
+          </p:cNvPr>
+          <p:cNvPicPr>
+            <a:picLocks noChangeAspect="1"/>
+          </p:cNvPicPr>
+          <p:nvPr/>
+        </p:nvPicPr>
+        <p:blipFill>
+          <a:blip r:embed="rId4"/>
+          <a:stretch>
+            <a:fillRect/>
+          </a:stretch>
+        </p:blipFill>
+        <p:spPr>
+          <a:xfrm>
+            <a:off x="1513461" y="694342"/>
+            <a:ext cx="9189050" cy="5694778"/>
           </a:xfrm>
           <a:prstGeom prst="rect">
             <a:avLst/>
@@ -6563,6 +7004,255 @@
     <p:extLst>
       <p:ext uri="{BB962C8B-B14F-4D97-AF65-F5344CB8AC3E}">
         <p14:creationId xmlns:p14="http://schemas.microsoft.com/office/powerpoint/2010/main" val="1610474756"/>
+      </p:ext>
+    </p:extLst>
+  </p:cSld>
+  <p:clrMapOvr>
+    <a:masterClrMapping/>
+  </p:clrMapOvr>
+</p:sld>
+</file>
+
+<file path=ppt/slides/slide8.xml><?xml version="1.0" encoding="utf-8"?>
+<p:sld xmlns:a="http://schemas.openxmlformats.org/drawingml/2006/main" xmlns:r="http://schemas.openxmlformats.org/officeDocument/2006/relationships" xmlns:p="http://schemas.openxmlformats.org/presentationml/2006/main">
+  <p:cSld>
+    <p:spTree>
+      <p:nvGrpSpPr>
+        <p:cNvPr id="1" name=""/>
+        <p:cNvGrpSpPr/>
+        <p:nvPr/>
+      </p:nvGrpSpPr>
+      <p:grpSpPr>
+        <a:xfrm>
+          <a:off x="0" y="0"/>
+          <a:ext cx="0" cy="0"/>
+          <a:chOff x="0" y="0"/>
+          <a:chExt cx="0" cy="0"/>
+        </a:xfrm>
+      </p:grpSpPr>
+      <p:pic>
+        <p:nvPicPr>
+          <p:cNvPr id="9" name="Picture 4" descr="Ironhack - Home | Facebook">
+            <a:extLst>
+              <a:ext uri="{FF2B5EF4-FFF2-40B4-BE49-F238E27FC236}">
+                <a16:creationId xmlns:a16="http://schemas.microsoft.com/office/drawing/2014/main" id="{24480A59-E6B8-A736-0948-4C719F0F3A8C}"/>
+              </a:ext>
+            </a:extLst>
+          </p:cNvPr>
+          <p:cNvPicPr>
+            <a:picLocks noChangeAspect="1" noChangeArrowheads="1"/>
+          </p:cNvPicPr>
+          <p:nvPr/>
+        </p:nvPicPr>
+        <p:blipFill>
+          <a:blip r:embed="rId2">
+            <a:extLst>
+              <a:ext uri="{28A0092B-C50C-407E-A947-70E740481C1C}">
+                <a14:useLocalDpi xmlns:a14="http://schemas.microsoft.com/office/drawing/2010/main" val="0"/>
+              </a:ext>
+            </a:extLst>
+          </a:blip>
+          <a:srcRect/>
+          <a:stretch>
+            <a:fillRect/>
+          </a:stretch>
+        </p:blipFill>
+        <p:spPr bwMode="auto">
+          <a:xfrm>
+            <a:off x="-1" y="55740"/>
+            <a:ext cx="1325587" cy="1325587"/>
+          </a:xfrm>
+          <a:prstGeom prst="rect">
+            <a:avLst/>
+          </a:prstGeom>
+          <a:noFill/>
+          <a:extLst>
+            <a:ext uri="{909E8E84-426E-40DD-AFC4-6F175D3DCCD1}">
+              <a14:hiddenFill xmlns:a14="http://schemas.microsoft.com/office/drawing/2010/main">
+                <a:solidFill>
+                  <a:srgbClr val="FFFFFF"/>
+                </a:solidFill>
+              </a14:hiddenFill>
+            </a:ext>
+          </a:extLst>
+        </p:spPr>
+      </p:pic>
+      <p:sp>
+        <p:nvSpPr>
+          <p:cNvPr id="10" name="CuadroTexto 9">
+            <a:extLst>
+              <a:ext uri="{FF2B5EF4-FFF2-40B4-BE49-F238E27FC236}">
+                <a16:creationId xmlns:a16="http://schemas.microsoft.com/office/drawing/2014/main" id="{F8426C71-F748-6BF2-A1F1-AB385FFF0316}"/>
+              </a:ext>
+            </a:extLst>
+          </p:cNvPr>
+          <p:cNvSpPr txBox="1"/>
+          <p:nvPr/>
+        </p:nvSpPr>
+        <p:spPr>
+          <a:xfrm>
+            <a:off x="1780162" y="92826"/>
+            <a:ext cx="8803532" cy="461665"/>
+          </a:xfrm>
+          <a:prstGeom prst="rect">
+            <a:avLst/>
+          </a:prstGeom>
+        </p:spPr>
+        <p:style>
+          <a:lnRef idx="2">
+            <a:schemeClr val="dk1"/>
+          </a:lnRef>
+          <a:fillRef idx="1">
+            <a:schemeClr val="lt1"/>
+          </a:fillRef>
+          <a:effectRef idx="0">
+            <a:schemeClr val="dk1"/>
+          </a:effectRef>
+          <a:fontRef idx="minor">
+            <a:schemeClr val="dk1"/>
+          </a:fontRef>
+        </p:style>
+        <p:txBody>
+          <a:bodyPr wrap="square">
+            <a:spAutoFit/>
+          </a:bodyPr>
+          <a:lstStyle/>
+          <a:p>
+            <a:pPr algn="ctr"/>
+            <a:r>
+              <a:rPr lang="en-US" sz="2400" b="1" dirty="0">
+                <a:latin typeface="Arial" panose="020B0604020202020204" pitchFamily="34" charset="0"/>
+              </a:rPr>
+              <a:t>Count per country</a:t>
+            </a:r>
+          </a:p>
+        </p:txBody>
+      </p:sp>
+      <p:pic>
+        <p:nvPicPr>
+          <p:cNvPr id="11" name="Imagen 10" descr="Un conjunto de letras blancas en un fondo blanco&#10;&#10;Descripción generada automáticamente con confianza media">
+            <a:extLst>
+              <a:ext uri="{FF2B5EF4-FFF2-40B4-BE49-F238E27FC236}">
+                <a16:creationId xmlns:a16="http://schemas.microsoft.com/office/drawing/2014/main" id="{1605704D-3E66-BD35-B04D-E3456C4268DC}"/>
+              </a:ext>
+            </a:extLst>
+          </p:cNvPr>
+          <p:cNvPicPr>
+            <a:picLocks noChangeAspect="1"/>
+          </p:cNvPicPr>
+          <p:nvPr/>
+        </p:nvPicPr>
+        <p:blipFill>
+          <a:blip r:embed="rId3">
+            <a:extLst>
+              <a:ext uri="{28A0092B-C50C-407E-A947-70E740481C1C}">
+                <a14:useLocalDpi xmlns:a14="http://schemas.microsoft.com/office/drawing/2010/main" val="0"/>
+              </a:ext>
+            </a:extLst>
+          </a:blip>
+          <a:stretch>
+            <a:fillRect/>
+          </a:stretch>
+        </p:blipFill>
+        <p:spPr>
+          <a:xfrm>
+            <a:off x="11012838" y="139959"/>
+            <a:ext cx="1075054" cy="1108767"/>
+          </a:xfrm>
+          <a:prstGeom prst="rect">
+            <a:avLst/>
+          </a:prstGeom>
+        </p:spPr>
+      </p:pic>
+      <p:sp>
+        <p:nvSpPr>
+          <p:cNvPr id="14" name="CuadroTexto 13">
+            <a:extLst>
+              <a:ext uri="{FF2B5EF4-FFF2-40B4-BE49-F238E27FC236}">
+                <a16:creationId xmlns:a16="http://schemas.microsoft.com/office/drawing/2014/main" id="{6A826930-AE12-F1C3-7C45-1CF415B7F9C5}"/>
+              </a:ext>
+            </a:extLst>
+          </p:cNvPr>
+          <p:cNvSpPr txBox="1"/>
+          <p:nvPr/>
+        </p:nvSpPr>
+        <p:spPr>
+          <a:xfrm>
+            <a:off x="108625" y="6389120"/>
+            <a:ext cx="2809673" cy="307777"/>
+          </a:xfrm>
+          <a:prstGeom prst="rect">
+            <a:avLst/>
+          </a:prstGeom>
+        </p:spPr>
+        <p:style>
+          <a:lnRef idx="2">
+            <a:schemeClr val="dk1"/>
+          </a:lnRef>
+          <a:fillRef idx="1">
+            <a:schemeClr val="lt1"/>
+          </a:fillRef>
+          <a:effectRef idx="0">
+            <a:schemeClr val="dk1"/>
+          </a:effectRef>
+          <a:fontRef idx="minor">
+            <a:schemeClr val="dk1"/>
+          </a:fontRef>
+        </p:style>
+        <p:txBody>
+          <a:bodyPr wrap="square">
+            <a:spAutoFit/>
+          </a:bodyPr>
+          <a:lstStyle/>
+          <a:p>
+            <a:pPr algn="ctr"/>
+            <a:r>
+              <a:rPr lang="en-US" sz="1400" b="1" i="0" dirty="0">
+                <a:effectLst/>
+                <a:latin typeface="Arial" panose="020B0604020202020204" pitchFamily="34" charset="0"/>
+              </a:rPr>
+              <a:t>DAVID MARTÍN CASERO</a:t>
+            </a:r>
+            <a:endParaRPr lang="en-US" sz="1400" b="1" dirty="0">
+              <a:latin typeface="Arial" panose="020B0604020202020204" pitchFamily="34" charset="0"/>
+            </a:endParaRPr>
+          </a:p>
+        </p:txBody>
+      </p:sp>
+      <p:pic>
+        <p:nvPicPr>
+          <p:cNvPr id="4" name="Imagen 3">
+            <a:extLst>
+              <a:ext uri="{FF2B5EF4-FFF2-40B4-BE49-F238E27FC236}">
+                <a16:creationId xmlns:a16="http://schemas.microsoft.com/office/drawing/2014/main" id="{64291155-7B88-2BFE-640D-20C03B51E240}"/>
+              </a:ext>
+            </a:extLst>
+          </p:cNvPr>
+          <p:cNvPicPr>
+            <a:picLocks noChangeAspect="1"/>
+          </p:cNvPicPr>
+          <p:nvPr/>
+        </p:nvPicPr>
+        <p:blipFill>
+          <a:blip r:embed="rId4"/>
+          <a:stretch>
+            <a:fillRect/>
+          </a:stretch>
+        </p:blipFill>
+        <p:spPr>
+          <a:xfrm>
+            <a:off x="521390" y="1551010"/>
+            <a:ext cx="11403440" cy="4705509"/>
+          </a:xfrm>
+          <a:prstGeom prst="rect">
+            <a:avLst/>
+          </a:prstGeom>
+        </p:spPr>
+      </p:pic>
+    </p:spTree>
+    <p:extLst>
+      <p:ext uri="{BB962C8B-B14F-4D97-AF65-F5344CB8AC3E}">
+        <p14:creationId xmlns:p14="http://schemas.microsoft.com/office/powerpoint/2010/main" val="4008668849"/>
       </p:ext>
     </p:extLst>
   </p:cSld>

</xml_diff>